<commit_message>
GetOnTo C++ Tutorial for Step 4 and 5
</commit_message>
<xml_diff>
--- a/Documents/MakeTechEzTrainingProgramme.pptx
+++ b/Documents/MakeTechEzTrainingProgramme.pptx
@@ -7,21 +7,22 @@
   <p:sldIdLst>
     <p:sldId id="256" r:id="rId2"/>
     <p:sldId id="257" r:id="rId3"/>
-    <p:sldId id="258" r:id="rId4"/>
-    <p:sldId id="259" r:id="rId5"/>
-    <p:sldId id="260" r:id="rId6"/>
-    <p:sldId id="261" r:id="rId7"/>
-    <p:sldId id="262" r:id="rId8"/>
-    <p:sldId id="263" r:id="rId9"/>
-    <p:sldId id="265" r:id="rId10"/>
-    <p:sldId id="267" r:id="rId11"/>
-    <p:sldId id="266" r:id="rId12"/>
-    <p:sldId id="268" r:id="rId13"/>
-    <p:sldId id="269" r:id="rId14"/>
-    <p:sldId id="270" r:id="rId15"/>
-    <p:sldId id="272" r:id="rId16"/>
-    <p:sldId id="273" r:id="rId17"/>
-    <p:sldId id="271" r:id="rId18"/>
+    <p:sldId id="274" r:id="rId4"/>
+    <p:sldId id="258" r:id="rId5"/>
+    <p:sldId id="259" r:id="rId6"/>
+    <p:sldId id="260" r:id="rId7"/>
+    <p:sldId id="261" r:id="rId8"/>
+    <p:sldId id="262" r:id="rId9"/>
+    <p:sldId id="263" r:id="rId10"/>
+    <p:sldId id="265" r:id="rId11"/>
+    <p:sldId id="267" r:id="rId12"/>
+    <p:sldId id="266" r:id="rId13"/>
+    <p:sldId id="268" r:id="rId14"/>
+    <p:sldId id="269" r:id="rId15"/>
+    <p:sldId id="270" r:id="rId16"/>
+    <p:sldId id="272" r:id="rId17"/>
+    <p:sldId id="273" r:id="rId18"/>
+    <p:sldId id="271" r:id="rId19"/>
   </p:sldIdLst>
   <p:sldSz cx="9144000" cy="6858000" type="screen4x3"/>
   <p:notesSz cx="6858000" cy="9144000"/>
@@ -406,7 +407,7 @@
           <a:p>
             <a:fld id="{B01F9CA3-105E-4857-9057-6DB6197DA786}" type="datetimeFigureOut">
               <a:rPr lang="en-US" smtClean="0"/>
-              <a:t>15/11/13</a:t>
+              <a:t>22/11/13</a:t>
             </a:fld>
             <a:endParaRPr lang="en-US" dirty="0"/>
           </a:p>
@@ -598,7 +599,7 @@
           <a:p>
             <a:fld id="{B01F9CA3-105E-4857-9057-6DB6197DA786}" type="datetimeFigureOut">
               <a:rPr lang="en-US" smtClean="0"/>
-              <a:t>15/11/13</a:t>
+              <a:t>22/11/13</a:t>
             </a:fld>
             <a:endParaRPr lang="en-US" dirty="0"/>
           </a:p>
@@ -867,7 +868,7 @@
           <a:p>
             <a:fld id="{B01F9CA3-105E-4857-9057-6DB6197DA786}" type="datetimeFigureOut">
               <a:rPr lang="en-US" smtClean="0"/>
-              <a:t>15/11/13</a:t>
+              <a:t>22/11/13</a:t>
             </a:fld>
             <a:endParaRPr lang="en-US" dirty="0"/>
           </a:p>
@@ -1046,7 +1047,7 @@
           <a:p>
             <a:fld id="{B01F9CA3-105E-4857-9057-6DB6197DA786}" type="datetimeFigureOut">
               <a:rPr lang="en-US" smtClean="0"/>
-              <a:t>15/11/13</a:t>
+              <a:t>22/11/13</a:t>
             </a:fld>
             <a:endParaRPr lang="en-US" dirty="0"/>
           </a:p>
@@ -1215,7 +1216,7 @@
           <a:p>
             <a:fld id="{B01F9CA3-105E-4857-9057-6DB6197DA786}" type="datetimeFigureOut">
               <a:rPr lang="en-US" smtClean="0"/>
-              <a:t>15/11/13</a:t>
+              <a:t>22/11/13</a:t>
             </a:fld>
             <a:endParaRPr lang="en-US" dirty="0"/>
           </a:p>
@@ -1457,7 +1458,7 @@
           <a:p>
             <a:fld id="{B01F9CA3-105E-4857-9057-6DB6197DA786}" type="datetimeFigureOut">
               <a:rPr lang="en-US" smtClean="0"/>
-              <a:t>15/11/13</a:t>
+              <a:t>22/11/13</a:t>
             </a:fld>
             <a:endParaRPr lang="en-US" dirty="0"/>
           </a:p>
@@ -1780,7 +1781,7 @@
           <a:p>
             <a:fld id="{B01F9CA3-105E-4857-9057-6DB6197DA786}" type="datetimeFigureOut">
               <a:rPr lang="en-US" smtClean="0"/>
-              <a:t>15/11/13</a:t>
+              <a:t>22/11/13</a:t>
             </a:fld>
             <a:endParaRPr lang="en-US" dirty="0"/>
           </a:p>
@@ -2078,7 +2079,7 @@
           <a:p>
             <a:fld id="{B01F9CA3-105E-4857-9057-6DB6197DA786}" type="datetimeFigureOut">
               <a:rPr lang="en-US" smtClean="0"/>
-              <a:t>15/11/13</a:t>
+              <a:t>22/11/13</a:t>
             </a:fld>
             <a:endParaRPr lang="en-US" dirty="0"/>
           </a:p>
@@ -2534,7 +2535,7 @@
           <a:p>
             <a:fld id="{B01F9CA3-105E-4857-9057-6DB6197DA786}" type="datetimeFigureOut">
               <a:rPr lang="en-US" smtClean="0"/>
-              <a:t>15/11/13</a:t>
+              <a:t>22/11/13</a:t>
             </a:fld>
             <a:endParaRPr lang="en-US" dirty="0"/>
           </a:p>
@@ -2647,7 +2648,7 @@
           <a:p>
             <a:fld id="{B01F9CA3-105E-4857-9057-6DB6197DA786}" type="datetimeFigureOut">
               <a:rPr lang="en-US" smtClean="0"/>
-              <a:t>15/11/13</a:t>
+              <a:t>22/11/13</a:t>
             </a:fld>
             <a:endParaRPr lang="en-US" dirty="0"/>
           </a:p>
@@ -2737,7 +2738,7 @@
           <a:p>
             <a:fld id="{B01F9CA3-105E-4857-9057-6DB6197DA786}" type="datetimeFigureOut">
               <a:rPr lang="en-US" smtClean="0"/>
-              <a:t>15/11/13</a:t>
+              <a:t>22/11/13</a:t>
             </a:fld>
             <a:endParaRPr lang="en-US" dirty="0"/>
           </a:p>
@@ -3019,7 +3020,7 @@
           <a:p>
             <a:fld id="{B01F9CA3-105E-4857-9057-6DB6197DA786}" type="datetimeFigureOut">
               <a:rPr lang="en-US" smtClean="0"/>
-              <a:t>15/11/13</a:t>
+              <a:t>22/11/13</a:t>
             </a:fld>
             <a:endParaRPr lang="en-US" dirty="0"/>
           </a:p>
@@ -3225,7 +3226,7 @@
           <a:p>
             <a:fld id="{B01F9CA3-105E-4857-9057-6DB6197DA786}" type="datetimeFigureOut">
               <a:rPr lang="en-US" smtClean="0"/>
-              <a:t>15/11/13</a:t>
+              <a:t>22/11/13</a:t>
             </a:fld>
             <a:endParaRPr lang="en-US" dirty="0"/>
           </a:p>
@@ -3804,13 +3805,8 @@
           <a:p>
             <a:r>
               <a:rPr lang="en-US" dirty="0"/>
-              <a:t>How </a:t>
-            </a:r>
-            <a:r>
-              <a:rPr lang="en-US" dirty="0" smtClean="0"/>
-              <a:t>MakeTechEZ Training Programme Works?</a:t>
-            </a:r>
-            <a:endParaRPr lang="en-US" dirty="0"/>
+              <a:t>Challenges</a:t>
+            </a:r>
           </a:p>
         </p:txBody>
       </p:sp>
@@ -3826,86 +3822,120 @@
         </p:nvSpPr>
         <p:spPr>
           <a:xfrm>
-            <a:off x="549275" y="1688406"/>
+            <a:off x="549275" y="1600201"/>
             <a:ext cx="8042276" cy="4697692"/>
           </a:xfrm>
         </p:spPr>
         <p:txBody>
           <a:bodyPr>
-            <a:normAutofit/>
+            <a:normAutofit fontScale="92500" lnSpcReduction="20000"/>
           </a:bodyPr>
           <a:lstStyle/>
           <a:p>
-            <a:pPr>
-              <a:spcAft>
-                <a:spcPts val="1200"/>
-              </a:spcAft>
-            </a:pPr>
+            <a:r>
+              <a:rPr lang="en-US" dirty="0" smtClean="0"/>
+              <a:t>Need for </a:t>
+            </a:r>
             <a:r>
               <a:rPr lang="en-US" b="1" dirty="0" smtClean="0"/>
-              <a:t>Content Design </a:t>
+              <a:t>Content </a:t>
+            </a:r>
+            <a:r>
+              <a:rPr lang="en-US" b="1" dirty="0"/>
+              <a:t>Design </a:t>
+            </a:r>
+            <a:r>
+              <a:rPr lang="en-US" dirty="0"/>
+              <a:t>- Should be predominantly Lab Based and </a:t>
             </a:r>
             <a:r>
               <a:rPr lang="en-US" dirty="0" smtClean="0"/>
-              <a:t>– </a:t>
-            </a:r>
-          </a:p>
-          <a:p>
-            <a:pPr lvl="1"/>
+              <a:t>Practical</a:t>
+            </a:r>
+          </a:p>
+          <a:p>
             <a:r>
               <a:rPr lang="en-US" dirty="0" smtClean="0"/>
-              <a:t>Introduces Concepts mainly by writing and compiling lot of programs than reading lot of theory. Its learning by practice</a:t>
-            </a:r>
-          </a:p>
-          <a:p>
-            <a:pPr lvl="1"/>
+              <a:t>Need for </a:t>
+            </a:r>
+            <a:r>
+              <a:rPr lang="en-US" b="1" dirty="0" smtClean="0"/>
+              <a:t>Qualified </a:t>
+            </a:r>
+            <a:r>
+              <a:rPr lang="en-US" b="1" dirty="0"/>
+              <a:t>Trainers </a:t>
+            </a:r>
             <a:r>
               <a:rPr lang="en-US" dirty="0"/>
-              <a:t>Its a </a:t>
+              <a:t>that can deliver this content and keep themselves updated with latest technology </a:t>
+            </a:r>
+            <a:r>
+              <a:rPr lang="en-US" dirty="0" smtClean="0"/>
+              <a:t>trends</a:t>
+            </a:r>
+          </a:p>
+          <a:p>
+            <a:r>
+              <a:rPr lang="en-US" dirty="0"/>
+              <a:t>Need for </a:t>
+            </a:r>
+            <a:r>
+              <a:rPr lang="en-US" b="1" dirty="0" smtClean="0"/>
+              <a:t>Infrastructure</a:t>
+            </a:r>
+            <a:r>
+              <a:rPr lang="en-US" dirty="0" smtClean="0"/>
+              <a:t> </a:t>
+            </a:r>
+            <a:r>
+              <a:rPr lang="en-US" dirty="0"/>
+              <a:t>that can be used to provide hands-on experience to students, particularly in technical </a:t>
+            </a:r>
+            <a:r>
+              <a:rPr lang="en-US" dirty="0" smtClean="0"/>
+              <a:t>education</a:t>
+            </a:r>
+          </a:p>
+          <a:p>
+            <a:r>
+              <a:rPr lang="en-US" dirty="0" smtClean="0"/>
+              <a:t>Need for </a:t>
+            </a:r>
+            <a:r>
+              <a:rPr lang="en-US" b="1" dirty="0" smtClean="0"/>
+              <a:t>One</a:t>
             </a:r>
             <a:r>
               <a:rPr lang="en-US" b="1" dirty="0"/>
-              <a:t>18 Step Process </a:t>
+              <a:t>-on-One Guide </a:t>
             </a:r>
             <a:r>
               <a:rPr lang="en-US" dirty="0"/>
-              <a:t>which can be completed in flat 2 - 4 weeks </a:t>
+              <a:t>to work with Fresh Engineers so that knowledge gap can be well understood and guided appropriately. Rather </a:t>
             </a:r>
             <a:r>
               <a:rPr lang="en-US" dirty="0" smtClean="0"/>
-              <a:t>time</a:t>
-            </a:r>
+              <a:t>than </a:t>
+            </a:r>
+            <a:r>
+              <a:rPr lang="en-US" dirty="0"/>
+              <a:t>Classroom learning which is done in ample in Engineering </a:t>
+            </a:r>
+            <a:r>
+              <a:rPr lang="en-US" dirty="0" smtClean="0"/>
+              <a:t>Schools</a:t>
+            </a:r>
+          </a:p>
+          <a:p>
             <a:endParaRPr lang="en-US" dirty="0"/>
-          </a:p>
-          <a:p>
-            <a:pPr lvl="1"/>
-            <a:r>
-              <a:rPr lang="en-US" dirty="0"/>
-              <a:t>Every Step introduces 5 - 10 concepts and each concepts is demonstrated with a sample code which are built, compiled and executed by </a:t>
-            </a:r>
-            <a:r>
-              <a:rPr lang="en-US" dirty="0" smtClean="0"/>
-              <a:t>engineers</a:t>
-            </a:r>
-          </a:p>
-          <a:p>
-            <a:pPr lvl="1"/>
-            <a:r>
-              <a:rPr lang="en-US" dirty="0"/>
-              <a:t>At the End of the Training Programme, Engineers would have written any-where between </a:t>
-            </a:r>
-            <a:r>
-              <a:rPr lang="en-US" b="1" dirty="0"/>
-              <a:t>150 - 200 Programs</a:t>
-            </a:r>
-            <a:endParaRPr lang="en-US" b="1" dirty="0" smtClean="0"/>
           </a:p>
         </p:txBody>
       </p:sp>
     </p:spTree>
     <p:extLst>
       <p:ext uri="{BB962C8B-B14F-4D97-AF65-F5344CB8AC3E}">
-        <p14:creationId xmlns:p14="http://schemas.microsoft.com/office/powerpoint/2010/main" val="1963680947"/>
+        <p14:creationId xmlns:p14="http://schemas.microsoft.com/office/powerpoint/2010/main" val="3787637028"/>
       </p:ext>
     </p:extLst>
   </p:cSld>
@@ -3972,11 +4002,11 @@
           <a:p>
             <a:r>
               <a:rPr lang="en-US" dirty="0"/>
-              <a:t>How MakeTechEZ Training Programme </a:t>
+              <a:t>How </a:t>
             </a:r>
             <a:r>
               <a:rPr lang="en-US" dirty="0" smtClean="0"/>
-              <a:t>Works?</a:t>
+              <a:t>MakeTechEZ Training Programme Works?</a:t>
             </a:r>
             <a:endParaRPr lang="en-US" dirty="0"/>
           </a:p>
@@ -3994,8 +4024,8 @@
         </p:nvSpPr>
         <p:spPr>
           <a:xfrm>
-            <a:off x="549275" y="1781757"/>
-            <a:ext cx="8042276" cy="4516136"/>
+            <a:off x="549275" y="1688406"/>
+            <a:ext cx="8042276" cy="4697692"/>
           </a:xfrm>
         </p:spPr>
         <p:txBody>
@@ -4010,12 +4040,8 @@
               </a:spcAft>
             </a:pPr>
             <a:r>
-              <a:rPr lang="en-US" b="1" dirty="0"/>
-              <a:t>Content </a:t>
-            </a:r>
-            <a:r>
               <a:rPr lang="en-US" b="1" dirty="0" smtClean="0"/>
-              <a:t>Mentoring </a:t>
+              <a:t>Content Design </a:t>
             </a:r>
             <a:r>
               <a:rPr lang="en-US" dirty="0" smtClean="0"/>
@@ -4025,95 +4051,59 @@
           <a:p>
             <a:pPr lvl="1"/>
             <a:r>
+              <a:rPr lang="en-US" dirty="0" smtClean="0"/>
+              <a:t>Introduces Concepts mainly by writing and compiling lot of programs than reading lot of theory. Its learning by practice</a:t>
+            </a:r>
+          </a:p>
+          <a:p>
+            <a:pPr lvl="1"/>
+            <a:r>
               <a:rPr lang="en-US" dirty="0"/>
-              <a:t>Mentoring Process is </a:t>
+              <a:t>Its a </a:t>
+            </a:r>
+            <a:r>
+              <a:rPr lang="en-US" b="1" dirty="0"/>
+              <a:t>18 Step Process </a:t>
+            </a:r>
+            <a:r>
+              <a:rPr lang="en-US" dirty="0"/>
+              <a:t>which can be completed in flat 2 - 4 weeks </a:t>
             </a:r>
             <a:r>
               <a:rPr lang="en-US" dirty="0" smtClean="0"/>
-              <a:t>based on the philosophy of  </a:t>
-            </a:r>
-            <a:r>
-              <a:rPr lang="en-US" b="1" dirty="0" smtClean="0"/>
-              <a:t>One </a:t>
+              <a:t>time</a:t>
+            </a:r>
+            <a:endParaRPr lang="en-US" dirty="0"/>
+          </a:p>
+          <a:p>
+            <a:pPr lvl="1"/>
+            <a:r>
+              <a:rPr lang="en-US" dirty="0"/>
+              <a:t>Every Step introduces 5 - 10 concepts and each concepts is demonstrated with a sample code which are built, compiled and executed by </a:t>
+            </a:r>
+            <a:r>
+              <a:rPr lang="en-US" dirty="0" smtClean="0"/>
+              <a:t>engineers</a:t>
+            </a:r>
+          </a:p>
+          <a:p>
+            <a:pPr lvl="1"/>
+            <a:r>
+              <a:rPr lang="en-US" dirty="0"/>
+              <a:t>At the End of the Training Programme, Engineers would have written any-where between </a:t>
             </a:r>
             <a:r>
               <a:rPr lang="en-US" b="1" dirty="0"/>
-              <a:t>Skill - One Mentor - One </a:t>
-            </a:r>
-            <a:r>
-              <a:rPr lang="en-US" b="1" dirty="0" smtClean="0"/>
-              <a:t>Student</a:t>
-            </a:r>
-            <a:r>
-              <a:rPr lang="en-US" dirty="0" smtClean="0"/>
-              <a:t>. </a:t>
-            </a:r>
-            <a:r>
-              <a:rPr lang="en-US" dirty="0"/>
-              <a:t>This helps to </a:t>
-            </a:r>
-            <a:r>
-              <a:rPr lang="en-US" dirty="0" smtClean="0"/>
-              <a:t>identify </a:t>
-            </a:r>
-            <a:r>
-              <a:rPr lang="en-US" dirty="0"/>
-              <a:t>skill gaps in the </a:t>
-            </a:r>
-            <a:r>
-              <a:rPr lang="en-US" dirty="0" smtClean="0"/>
-              <a:t>engineers </a:t>
-            </a:r>
-            <a:r>
-              <a:rPr lang="en-US" dirty="0"/>
-              <a:t>and guide </a:t>
-            </a:r>
-            <a:r>
-              <a:rPr lang="en-US" dirty="0" smtClean="0"/>
-              <a:t>them appropriately</a:t>
-            </a:r>
-          </a:p>
-          <a:p>
-            <a:pPr lvl="1"/>
-            <a:r>
-              <a:rPr lang="en-US" dirty="0"/>
-              <a:t>After Every Step </a:t>
-            </a:r>
-            <a:r>
-              <a:rPr lang="en-US" dirty="0" smtClean="0"/>
-              <a:t>mentor </a:t>
-            </a:r>
-            <a:r>
-              <a:rPr lang="en-US" dirty="0"/>
-              <a:t>cross </a:t>
-            </a:r>
-            <a:r>
-              <a:rPr lang="en-US" dirty="0" smtClean="0"/>
-              <a:t>examines the engineer one</a:t>
-            </a:r>
-            <a:r>
-              <a:rPr lang="en-US" dirty="0"/>
-              <a:t>-on-one </a:t>
-            </a:r>
-            <a:r>
-              <a:rPr lang="en-US" dirty="0" smtClean="0"/>
-              <a:t>to </a:t>
-            </a:r>
-            <a:r>
-              <a:rPr lang="en-US" dirty="0"/>
-              <a:t>check the level of understanding and </a:t>
-            </a:r>
-            <a:r>
-              <a:rPr lang="en-US" dirty="0" smtClean="0"/>
-              <a:t>give  them practice programs accordingly.</a:t>
-            </a:r>
+              <a:t>150 - 200 Programs</a:t>
+            </a:r>
+            <a:endParaRPr lang="en-US" b="1" dirty="0" smtClean="0"/>
           </a:p>
         </p:txBody>
       </p:sp>
     </p:spTree>
     <p:extLst>
       <p:ext uri="{BB962C8B-B14F-4D97-AF65-F5344CB8AC3E}">
-        <p14:creationId xmlns:p14="http://schemas.microsoft.com/office/powerpoint/2010/main" val="4190317840"/>
+        <p14:creationId xmlns:p14="http://schemas.microsoft.com/office/powerpoint/2010/main" val="1963680947"/>
       </p:ext>
     </p:extLst>
   </p:cSld>
@@ -4202,8 +4192,8 @@
         </p:nvSpPr>
         <p:spPr>
           <a:xfrm>
-            <a:off x="549275" y="1764115"/>
-            <a:ext cx="8042276" cy="4533777"/>
+            <a:off x="549275" y="1781757"/>
+            <a:ext cx="8042276" cy="4516136"/>
           </a:xfrm>
         </p:spPr>
         <p:txBody>
@@ -4218,47 +4208,110 @@
               </a:spcAft>
             </a:pPr>
             <a:r>
+              <a:rPr lang="en-US" b="1" dirty="0"/>
+              <a:t>Content </a:t>
+            </a:r>
+            <a:r>
               <a:rPr lang="en-US" b="1" dirty="0" smtClean="0"/>
-              <a:t>Content Delivery </a:t>
-            </a:r>
+              <a:t>Mentoring </a:t>
+            </a:r>
+            <a:r>
+              <a:rPr lang="en-US" dirty="0" smtClean="0"/>
+              <a:t>– </a:t>
+            </a:r>
+          </a:p>
+          <a:p>
+            <a:pPr lvl="1"/>
             <a:r>
               <a:rPr lang="en-US" dirty="0"/>
-              <a:t>– </a:t>
+              <a:t>Mentoring Process is </a:t>
+            </a:r>
+            <a:r>
+              <a:rPr lang="en-US" dirty="0" smtClean="0"/>
+              <a:t>based on the philosophy of  </a:t>
+            </a:r>
+            <a:r>
+              <a:rPr lang="en-US" b="1" dirty="0" smtClean="0"/>
+              <a:t>One </a:t>
+            </a:r>
+            <a:r>
+              <a:rPr lang="en-US" b="1" dirty="0"/>
+              <a:t>Skill - One Mentor - One </a:t>
+            </a:r>
+            <a:r>
+              <a:rPr lang="en-US" b="1" dirty="0" smtClean="0"/>
+              <a:t>Student</a:t>
+            </a:r>
+            <a:r>
+              <a:rPr lang="en-US" dirty="0" smtClean="0"/>
+              <a:t>. </a:t>
+            </a:r>
+            <a:r>
+              <a:rPr lang="en-US" dirty="0"/>
+              <a:t>This helps to </a:t>
+            </a:r>
+            <a:r>
+              <a:rPr lang="en-US" dirty="0" smtClean="0"/>
+              <a:t>identify </a:t>
+            </a:r>
+            <a:r>
+              <a:rPr lang="en-US" dirty="0"/>
+              <a:t>skill gaps in the </a:t>
+            </a:r>
+            <a:r>
+              <a:rPr lang="en-US" dirty="0" smtClean="0"/>
+              <a:t>engineers </a:t>
+            </a:r>
+            <a:r>
+              <a:rPr lang="en-US" dirty="0"/>
+              <a:t>and guide </a:t>
+            </a:r>
+            <a:r>
+              <a:rPr lang="en-US" dirty="0" smtClean="0"/>
+              <a:t>them appropriately</a:t>
             </a:r>
           </a:p>
           <a:p>
             <a:pPr lvl="1"/>
             <a:r>
               <a:rPr lang="en-US" dirty="0"/>
-              <a:t>Online Training </a:t>
+              <a:t>After Every Step </a:t>
             </a:r>
             <a:r>
               <a:rPr lang="en-US" dirty="0" smtClean="0"/>
-              <a:t>Content and Self Paced Study by Engineer</a:t>
-            </a:r>
-          </a:p>
-          <a:p>
-            <a:pPr lvl="1"/>
+              <a:t>mentor </a:t>
+            </a:r>
             <a:r>
               <a:rPr lang="en-US" dirty="0"/>
-              <a:t>Mentor and Engineer connect using Google Hangout or Skype One-on-One where-in Mentor can see the shared desktop of engineer, ask questions on concepts and give </a:t>
+              <a:t>cross </a:t>
             </a:r>
             <a:r>
               <a:rPr lang="en-US" dirty="0" smtClean="0"/>
-              <a:t>Practice Programs </a:t>
+              <a:t>examines the engineer one</a:t>
             </a:r>
             <a:r>
               <a:rPr lang="en-US" dirty="0"/>
-              <a:t>from the pre-defined list</a:t>
-            </a:r>
-            <a:endParaRPr lang="en-US" dirty="0" smtClean="0"/>
+              <a:t>-on-one </a:t>
+            </a:r>
+            <a:r>
+              <a:rPr lang="en-US" dirty="0" smtClean="0"/>
+              <a:t>to </a:t>
+            </a:r>
+            <a:r>
+              <a:rPr lang="en-US" dirty="0"/>
+              <a:t>check the level of understanding and </a:t>
+            </a:r>
+            <a:r>
+              <a:rPr lang="en-US" dirty="0" smtClean="0"/>
+              <a:t>give  them practice programs accordingly.</a:t>
+            </a:r>
           </a:p>
         </p:txBody>
       </p:sp>
     </p:spTree>
     <p:extLst>
       <p:ext uri="{BB962C8B-B14F-4D97-AF65-F5344CB8AC3E}">
-        <p14:creationId xmlns:p14="http://schemas.microsoft.com/office/powerpoint/2010/main" val="4108502842"/>
+        <p14:creationId xmlns:p14="http://schemas.microsoft.com/office/powerpoint/2010/main" val="4190317840"/>
       </p:ext>
     </p:extLst>
   </p:cSld>
@@ -4324,13 +4377,14 @@
           <a:lstStyle/>
           <a:p>
             <a:r>
+              <a:rPr lang="en-US" dirty="0"/>
+              <a:t>How MakeTechEZ Training Programme </a:t>
+            </a:r>
+            <a:r>
               <a:rPr lang="en-US" dirty="0" smtClean="0"/>
-              <a:t>How MakeTechEz Training Programme is different</a:t>
-            </a:r>
-            <a:r>
-              <a:rPr lang="en-US" dirty="0"/>
-              <a:t>?</a:t>
-            </a:r>
+              <a:t>Works?</a:t>
+            </a:r>
+            <a:endParaRPr lang="en-US" dirty="0"/>
           </a:p>
         </p:txBody>
       </p:sp>
@@ -4346,75 +4400,63 @@
         </p:nvSpPr>
         <p:spPr>
           <a:xfrm>
-            <a:off x="549275" y="1758970"/>
-            <a:ext cx="8042276" cy="4397793"/>
+            <a:off x="549275" y="1764115"/>
+            <a:ext cx="8042276" cy="4533777"/>
           </a:xfrm>
         </p:spPr>
         <p:txBody>
-          <a:bodyPr anchor="ctr" anchorCtr="0">
+          <a:bodyPr>
             <a:normAutofit/>
           </a:bodyPr>
           <a:lstStyle/>
           <a:p>
-            <a:r>
-              <a:rPr lang="en-US" sz="2600" dirty="0"/>
-              <a:t>Its </a:t>
-            </a:r>
-            <a:r>
-              <a:rPr lang="en-US" sz="2600" b="1" dirty="0"/>
-              <a:t>One Skill - One Mentor - One Student </a:t>
-            </a:r>
-            <a:r>
-              <a:rPr lang="en-US" sz="2600" dirty="0"/>
-              <a:t>Training </a:t>
-            </a:r>
-            <a:r>
-              <a:rPr lang="en-US" sz="2600" dirty="0" smtClean="0"/>
-              <a:t>Programme</a:t>
-            </a:r>
-          </a:p>
-          <a:p>
-            <a:r>
-              <a:rPr lang="en-US" sz="2600" dirty="0"/>
-              <a:t>Completely Streamlined </a:t>
-            </a:r>
-            <a:r>
-              <a:rPr lang="en-US" sz="2600" b="1" dirty="0"/>
-              <a:t>Online Platform </a:t>
-            </a:r>
-            <a:r>
-              <a:rPr lang="en-US" sz="2600" dirty="0"/>
-              <a:t>and Not Classroom </a:t>
-            </a:r>
-            <a:r>
-              <a:rPr lang="en-US" sz="2600" dirty="0" smtClean="0"/>
-              <a:t>Based</a:t>
-            </a:r>
-          </a:p>
-          <a:p>
-            <a:r>
-              <a:rPr lang="en-US" sz="2600" dirty="0"/>
-              <a:t>Lot of </a:t>
-            </a:r>
-            <a:r>
-              <a:rPr lang="en-US" sz="2600" b="1" dirty="0"/>
-              <a:t>Lab Work </a:t>
-            </a:r>
-            <a:r>
-              <a:rPr lang="en-US" sz="2600" dirty="0"/>
-              <a:t>and Programming and less of </a:t>
-            </a:r>
-            <a:r>
-              <a:rPr lang="en-US" sz="2600" dirty="0" smtClean="0"/>
-              <a:t>theory</a:t>
-            </a:r>
+            <a:pPr>
+              <a:spcAft>
+                <a:spcPts val="1200"/>
+              </a:spcAft>
+            </a:pPr>
+            <a:r>
+              <a:rPr lang="en-US" b="1" dirty="0" smtClean="0"/>
+              <a:t>Content Delivery </a:t>
+            </a:r>
+            <a:r>
+              <a:rPr lang="en-US" dirty="0"/>
+              <a:t>– </a:t>
+            </a:r>
+          </a:p>
+          <a:p>
+            <a:pPr lvl="1"/>
+            <a:r>
+              <a:rPr lang="en-US" dirty="0"/>
+              <a:t>Online Training </a:t>
+            </a:r>
+            <a:r>
+              <a:rPr lang="en-US" dirty="0" smtClean="0"/>
+              <a:t>Content and Self Paced Study by Engineer</a:t>
+            </a:r>
+          </a:p>
+          <a:p>
+            <a:pPr lvl="1"/>
+            <a:r>
+              <a:rPr lang="en-US" dirty="0"/>
+              <a:t>Mentor and Engineer connect using Google Hangout or Skype One-on-One where-in Mentor can see the shared desktop of engineer, ask questions on concepts and give </a:t>
+            </a:r>
+            <a:r>
+              <a:rPr lang="en-US" dirty="0" smtClean="0"/>
+              <a:t>Practice Programs </a:t>
+            </a:r>
+            <a:r>
+              <a:rPr lang="en-US" dirty="0"/>
+              <a:t>from the pre-defined list</a:t>
+            </a:r>
+            <a:endParaRPr lang="en-US" dirty="0" smtClean="0"/>
           </a:p>
         </p:txBody>
       </p:sp>
     </p:spTree>
     <p:extLst>
       <p:ext uri="{BB962C8B-B14F-4D97-AF65-F5344CB8AC3E}">
-        <p14:creationId xmlns:p14="http://schemas.microsoft.com/office/powerpoint/2010/main" val="3825490614"/>
+        <p14:creationId xmlns:p14="http://schemas.microsoft.com/office/powerpoint/2010/main" val="4108502842"/>
       </p:ext>
     </p:extLst>
   </p:cSld>
@@ -4502,7 +4544,7 @@
         </p:nvSpPr>
         <p:spPr>
           <a:xfrm>
-            <a:off x="549275" y="1776611"/>
+            <a:off x="549275" y="1758970"/>
             <a:ext cx="8042276" cy="4397793"/>
           </a:xfrm>
         </p:spPr>
@@ -4513,69 +4555,64 @@
           <a:lstStyle/>
           <a:p>
             <a:r>
+              <a:rPr lang="en-US" sz="2600" dirty="0"/>
+              <a:t>Its </a:t>
+            </a:r>
+            <a:r>
+              <a:rPr lang="en-US" sz="2600" b="1" dirty="0"/>
+              <a:t>One Skill - One Mentor - One Student </a:t>
+            </a:r>
+            <a:r>
+              <a:rPr lang="en-US" sz="2600" dirty="0"/>
+              <a:t>Training </a:t>
+            </a:r>
+            <a:r>
               <a:rPr lang="en-US" sz="2600" dirty="0" smtClean="0"/>
-              <a:t>Easily </a:t>
+              <a:t>Programme</a:t>
+            </a:r>
+          </a:p>
+          <a:p>
+            <a:r>
+              <a:rPr lang="en-US" sz="2600" dirty="0"/>
+              <a:t>Completely Streamlined </a:t>
             </a:r>
             <a:r>
               <a:rPr lang="en-US" sz="2600" b="1" dirty="0"/>
-              <a:t>reachable</a:t>
+              <a:t>Online Platform </a:t>
             </a:r>
             <a:r>
               <a:rPr lang="en-US" sz="2600" dirty="0"/>
-              <a:t> </a:t>
+              <a:t>and Not Classroom </a:t>
+            </a:r>
+            <a:r>
+              <a:rPr lang="en-US" sz="2600" dirty="0" smtClean="0"/>
+              <a:t>Based</a:t>
+            </a:r>
+          </a:p>
+          <a:p>
+            <a:r>
+              <a:rPr lang="en-US" sz="2600" dirty="0"/>
+              <a:t>Lot of </a:t>
             </a:r>
             <a:r>
               <a:rPr lang="en-US" sz="2600" b="1" dirty="0"/>
-              <a:t>and available</a:t>
+              <a:t>Lab Work </a:t>
             </a:r>
             <a:r>
               <a:rPr lang="en-US" sz="2600" dirty="0"/>
-              <a:t> to wide range engineers from different </a:t>
+              <a:t>and Programming and less of </a:t>
             </a:r>
             <a:r>
               <a:rPr lang="en-US" sz="2600" dirty="0" smtClean="0"/>
-              <a:t>locations</a:t>
-            </a:r>
-          </a:p>
-          <a:p>
-            <a:r>
-              <a:rPr lang="en-US" sz="2600" b="1" dirty="0"/>
-              <a:t>Skilled Mentors </a:t>
-            </a:r>
-            <a:r>
-              <a:rPr lang="en-US" sz="2600" dirty="0"/>
-              <a:t>from industry will be available unlike in training </a:t>
-            </a:r>
-            <a:r>
-              <a:rPr lang="en-US" sz="2600" dirty="0" smtClean="0"/>
-              <a:t>institutes</a:t>
-            </a:r>
-          </a:p>
-          <a:p>
-            <a:r>
-              <a:rPr lang="en-US" sz="2600" b="1" dirty="0" smtClean="0"/>
-              <a:t>Real-time </a:t>
-            </a:r>
-            <a:r>
-              <a:rPr lang="en-US" sz="2600" b="1" dirty="0"/>
-              <a:t>use of technology </a:t>
-            </a:r>
-            <a:r>
-              <a:rPr lang="en-US" sz="2600" dirty="0"/>
-              <a:t>and concepts will be delivered unlike Bookish Knowledge however </a:t>
-            </a:r>
-            <a:r>
-              <a:rPr lang="en-US" sz="2600" dirty="0" smtClean="0"/>
-              <a:t>updated</a:t>
-            </a:r>
-            <a:endParaRPr lang="en-US" sz="2600" dirty="0"/>
+              <a:t>theory</a:t>
+            </a:r>
           </a:p>
         </p:txBody>
       </p:sp>
     </p:spTree>
     <p:extLst>
       <p:ext uri="{BB962C8B-B14F-4D97-AF65-F5344CB8AC3E}">
-        <p14:creationId xmlns:p14="http://schemas.microsoft.com/office/powerpoint/2010/main" val="1312750657"/>
+        <p14:creationId xmlns:p14="http://schemas.microsoft.com/office/powerpoint/2010/main" val="3825490614"/>
       </p:ext>
     </p:extLst>
   </p:cSld>
@@ -4642,9 +4679,12 @@
           <a:p>
             <a:r>
               <a:rPr lang="en-US" dirty="0" smtClean="0"/>
-              <a:t>Benefit to Corporates</a:t>
-            </a:r>
-            <a:endParaRPr lang="en-US" dirty="0"/>
+              <a:t>How MakeTechEz Training Programme is different</a:t>
+            </a:r>
+            <a:r>
+              <a:rPr lang="en-US" dirty="0"/>
+              <a:t>?</a:t>
+            </a:r>
           </a:p>
         </p:txBody>
       </p:sp>
@@ -4660,83 +4700,71 @@
         </p:nvSpPr>
         <p:spPr>
           <a:xfrm>
-            <a:off x="549275" y="1335586"/>
-            <a:ext cx="8042276" cy="4856460"/>
+            <a:off x="549275" y="1776611"/>
+            <a:ext cx="8042276" cy="4397793"/>
           </a:xfrm>
         </p:spPr>
         <p:txBody>
           <a:bodyPr anchor="ctr" anchorCtr="0">
-            <a:normAutofit fontScale="92500" lnSpcReduction="10000"/>
+            <a:normAutofit/>
           </a:bodyPr>
           <a:lstStyle/>
           <a:p>
             <a:r>
+              <a:rPr lang="en-US" sz="2600" dirty="0" smtClean="0"/>
+              <a:t>Easily </a:t>
+            </a:r>
+            <a:r>
+              <a:rPr lang="en-US" sz="2600" b="1" dirty="0"/>
+              <a:t>reachable</a:t>
+            </a:r>
+            <a:r>
               <a:rPr lang="en-US" sz="2600" dirty="0"/>
-              <a:t>Corporate on an average spend </a:t>
+              <a:t> </a:t>
+            </a:r>
+            <a:r>
+              <a:rPr lang="en-US" sz="2600" b="1" dirty="0"/>
+              <a:t>and available</a:t>
+            </a:r>
+            <a:r>
+              <a:rPr lang="en-US" sz="2600" dirty="0"/>
+              <a:t> to wide range engineers from different </a:t>
             </a:r>
             <a:r>
               <a:rPr lang="en-US" sz="2600" dirty="0" smtClean="0"/>
-              <a:t>around Rs 60,000 on </a:t>
+              <a:t>locations</a:t>
+            </a:r>
+          </a:p>
+          <a:p>
+            <a:r>
+              <a:rPr lang="en-US" sz="2600" b="1" dirty="0"/>
+              <a:t>Skilled Mentors </a:t>
             </a:r>
             <a:r>
               <a:rPr lang="en-US" sz="2600" dirty="0"/>
-              <a:t>training the fresh engineers. </a:t>
+              <a:t>from industry will be available unlike in training </a:t>
             </a:r>
             <a:r>
               <a:rPr lang="en-US" sz="2600" dirty="0" smtClean="0"/>
-              <a:t>MakeTechEz encourages </a:t>
+              <a:t>institutes</a:t>
+            </a:r>
+          </a:p>
+          <a:p>
+            <a:r>
+              <a:rPr lang="en-US" sz="2600" b="1" dirty="0" smtClean="0"/>
+              <a:t>Real-time </a:t>
+            </a:r>
+            <a:r>
+              <a:rPr lang="en-US" sz="2600" b="1" dirty="0"/>
+              <a:t>use of technology </a:t>
             </a:r>
             <a:r>
               <a:rPr lang="en-US" sz="2600" dirty="0"/>
-              <a:t>the engineers to take the training. So Corporates not only gets trained staff but also get confident and motivated Engineers who are ready to dive into </a:t>
+              <a:t>and concepts will be delivered unlike Bookish Knowledge however </a:t>
             </a:r>
             <a:r>
               <a:rPr lang="en-US" sz="2600" dirty="0" smtClean="0"/>
-              <a:t>programming</a:t>
-            </a:r>
-          </a:p>
-          <a:p>
-            <a:r>
-              <a:rPr lang="en-US" sz="2600" dirty="0"/>
-              <a:t>Companies </a:t>
-            </a:r>
-            <a:r>
-              <a:rPr lang="en-US" sz="2600" dirty="0" smtClean="0"/>
-              <a:t>can expect </a:t>
-            </a:r>
-            <a:r>
-              <a:rPr lang="en-US" sz="2600" dirty="0"/>
-              <a:t>the fresh </a:t>
-            </a:r>
-            <a:r>
-              <a:rPr lang="en-US" sz="2600" dirty="0" smtClean="0"/>
-              <a:t>recruits </a:t>
-            </a:r>
-            <a:r>
-              <a:rPr lang="en-US" sz="2600" dirty="0"/>
-              <a:t>to get productive on the first or second month itself instead of usual 4 to 6 </a:t>
-            </a:r>
-            <a:r>
-              <a:rPr lang="en-US" sz="2600" dirty="0" smtClean="0"/>
-              <a:t>months</a:t>
-            </a:r>
-          </a:p>
-          <a:p>
-            <a:r>
-              <a:rPr lang="en-US" sz="2600" dirty="0"/>
-              <a:t>Companies will have a pool of fresh </a:t>
-            </a:r>
-            <a:r>
-              <a:rPr lang="en-US" sz="2600" dirty="0" smtClean="0"/>
-              <a:t>engineering which </a:t>
-            </a:r>
-            <a:r>
-              <a:rPr lang="en-US" sz="2600" dirty="0"/>
-              <a:t>earlier they have to seek out by visiting </a:t>
-            </a:r>
-            <a:r>
-              <a:rPr lang="en-US" sz="2600" dirty="0" smtClean="0"/>
-              <a:t>campuses</a:t>
+              <a:t>updated</a:t>
             </a:r>
             <a:endParaRPr lang="en-US" sz="2600" dirty="0"/>
           </a:p>
@@ -4745,7 +4773,7 @@
     </p:spTree>
     <p:extLst>
       <p:ext uri="{BB962C8B-B14F-4D97-AF65-F5344CB8AC3E}">
-        <p14:creationId xmlns:p14="http://schemas.microsoft.com/office/powerpoint/2010/main" val="3058417814"/>
+        <p14:creationId xmlns:p14="http://schemas.microsoft.com/office/powerpoint/2010/main" val="1312750657"/>
       </p:ext>
     </p:extLst>
   </p:cSld>
@@ -4812,6 +4840,176 @@
           <a:p>
             <a:r>
               <a:rPr lang="en-US" dirty="0" smtClean="0"/>
+              <a:t>Benefit to Corporates</a:t>
+            </a:r>
+            <a:endParaRPr lang="en-US" dirty="0"/>
+          </a:p>
+        </p:txBody>
+      </p:sp>
+      <p:sp>
+        <p:nvSpPr>
+          <p:cNvPr id="3" name="Content Placeholder 2"/>
+          <p:cNvSpPr>
+            <a:spLocks noGrp="1"/>
+          </p:cNvSpPr>
+          <p:nvPr>
+            <p:ph idx="1"/>
+          </p:nvPr>
+        </p:nvSpPr>
+        <p:spPr>
+          <a:xfrm>
+            <a:off x="549275" y="1335586"/>
+            <a:ext cx="8042276" cy="4856460"/>
+          </a:xfrm>
+        </p:spPr>
+        <p:txBody>
+          <a:bodyPr anchor="ctr" anchorCtr="0">
+            <a:normAutofit fontScale="92500" lnSpcReduction="10000"/>
+          </a:bodyPr>
+          <a:lstStyle/>
+          <a:p>
+            <a:r>
+              <a:rPr lang="en-US" sz="2600" dirty="0"/>
+              <a:t>Corporate on an average spend </a:t>
+            </a:r>
+            <a:r>
+              <a:rPr lang="en-US" sz="2600" dirty="0" smtClean="0"/>
+              <a:t>around Rs 60,000 on </a:t>
+            </a:r>
+            <a:r>
+              <a:rPr lang="en-US" sz="2600" dirty="0"/>
+              <a:t>training the fresh engineers. </a:t>
+            </a:r>
+            <a:r>
+              <a:rPr lang="en-US" sz="2600" dirty="0" smtClean="0"/>
+              <a:t>MakeTechEz encourages </a:t>
+            </a:r>
+            <a:r>
+              <a:rPr lang="en-US" sz="2600" dirty="0"/>
+              <a:t>the engineers to take the training. So Corporates not only gets trained staff but also get confident and motivated Engineers who are ready to dive into </a:t>
+            </a:r>
+            <a:r>
+              <a:rPr lang="en-US" sz="2600" dirty="0" smtClean="0"/>
+              <a:t>programming</a:t>
+            </a:r>
+          </a:p>
+          <a:p>
+            <a:r>
+              <a:rPr lang="en-US" sz="2600" dirty="0"/>
+              <a:t>Companies </a:t>
+            </a:r>
+            <a:r>
+              <a:rPr lang="en-US" sz="2600" dirty="0" smtClean="0"/>
+              <a:t>can expect </a:t>
+            </a:r>
+            <a:r>
+              <a:rPr lang="en-US" sz="2600" dirty="0"/>
+              <a:t>the fresh </a:t>
+            </a:r>
+            <a:r>
+              <a:rPr lang="en-US" sz="2600" dirty="0" smtClean="0"/>
+              <a:t>recruits </a:t>
+            </a:r>
+            <a:r>
+              <a:rPr lang="en-US" sz="2600" dirty="0"/>
+              <a:t>to get productive on the first or second month itself instead of usual 4 to 6 </a:t>
+            </a:r>
+            <a:r>
+              <a:rPr lang="en-US" sz="2600" dirty="0" smtClean="0"/>
+              <a:t>months</a:t>
+            </a:r>
+          </a:p>
+          <a:p>
+            <a:r>
+              <a:rPr lang="en-US" sz="2600" dirty="0"/>
+              <a:t>Companies will have a pool of fresh </a:t>
+            </a:r>
+            <a:r>
+              <a:rPr lang="en-US" sz="2600" dirty="0" smtClean="0"/>
+              <a:t>engineering which </a:t>
+            </a:r>
+            <a:r>
+              <a:rPr lang="en-US" sz="2600" dirty="0"/>
+              <a:t>earlier they have to seek out by visiting </a:t>
+            </a:r>
+            <a:r>
+              <a:rPr lang="en-US" sz="2600" dirty="0" smtClean="0"/>
+              <a:t>campuses</a:t>
+            </a:r>
+            <a:endParaRPr lang="en-US" sz="2600" dirty="0"/>
+          </a:p>
+        </p:txBody>
+      </p:sp>
+    </p:spTree>
+    <p:extLst>
+      <p:ext uri="{BB962C8B-B14F-4D97-AF65-F5344CB8AC3E}">
+        <p14:creationId xmlns:p14="http://schemas.microsoft.com/office/powerpoint/2010/main" val="3058417814"/>
+      </p:ext>
+    </p:extLst>
+  </p:cSld>
+  <p:clrMapOvr>
+    <a:masterClrMapping/>
+  </p:clrMapOvr>
+  <p:timing>
+    <p:tnLst>
+      <p:par>
+        <p:cTn xmlns:p14="http://schemas.microsoft.com/office/powerpoint/2010/main" id="1" dur="indefinite" restart="never" nodeType="tmRoot"/>
+      </p:par>
+    </p:tnLst>
+  </p:timing>
+</p:sld>
+</file>
+
+<file path=ppt/slides/slide17.xml><?xml version="1.0" encoding="utf-8"?>
+<p:sld xmlns:a="http://schemas.openxmlformats.org/drawingml/2006/main" xmlns:r="http://schemas.openxmlformats.org/officeDocument/2006/relationships" xmlns:p="http://schemas.openxmlformats.org/presentationml/2006/main">
+  <p:cSld>
+    <p:spTree>
+      <p:nvGrpSpPr>
+        <p:cNvPr id="1" name=""/>
+        <p:cNvGrpSpPr/>
+        <p:nvPr/>
+      </p:nvGrpSpPr>
+      <p:grpSpPr>
+        <a:xfrm>
+          <a:off x="0" y="0"/>
+          <a:ext cx="0" cy="0"/>
+          <a:chOff x="0" y="0"/>
+          <a:chExt cx="0" cy="0"/>
+        </a:xfrm>
+      </p:grpSpPr>
+      <p:sp>
+        <p:nvSpPr>
+          <p:cNvPr id="2" name="Title 1"/>
+          <p:cNvSpPr>
+            <a:spLocks noGrp="1"/>
+          </p:cNvSpPr>
+          <p:nvPr>
+            <p:ph type="title"/>
+          </p:nvPr>
+        </p:nvSpPr>
+        <p:spPr/>
+        <p:style>
+          <a:lnRef idx="2">
+            <a:schemeClr val="accent1">
+              <a:shade val="50000"/>
+            </a:schemeClr>
+          </a:lnRef>
+          <a:fillRef idx="1">
+            <a:schemeClr val="accent1"/>
+          </a:fillRef>
+          <a:effectRef idx="0">
+            <a:schemeClr val="accent1"/>
+          </a:effectRef>
+          <a:fontRef idx="minor">
+            <a:schemeClr val="lt1"/>
+          </a:fontRef>
+        </p:style>
+        <p:txBody>
+          <a:bodyPr anchor="ctr" anchorCtr="0"/>
+          <a:lstStyle/>
+          <a:p>
+            <a:r>
+              <a:rPr lang="en-US" dirty="0" smtClean="0"/>
               <a:t>Benefit to Fresh Engineers</a:t>
             </a:r>
             <a:endParaRPr lang="en-US" dirty="0"/>
@@ -4900,7 +5098,7 @@
 </p:sld>
 </file>
 
-<file path=ppt/slides/slide17.xml><?xml version="1.0" encoding="utf-8"?>
+<file path=ppt/slides/slide18.xml><?xml version="1.0" encoding="utf-8"?>
 <p:sld xmlns:a="http://schemas.openxmlformats.org/drawingml/2006/main" xmlns:r="http://schemas.openxmlformats.org/officeDocument/2006/relationships" xmlns:p="http://schemas.openxmlformats.org/presentationml/2006/main">
   <p:cSld>
     <p:spTree>
@@ -5183,7 +5381,7 @@
           <a:p>
             <a:r>
               <a:rPr lang="en-US" dirty="0"/>
-              <a:t>Experts Opinion</a:t>
+              <a:t>Engineers, Are They Employable?</a:t>
             </a:r>
           </a:p>
         </p:txBody>
@@ -5198,40 +5396,36 @@
             <p:ph idx="1"/>
           </p:nvPr>
         </p:nvSpPr>
-        <p:spPr/>
-        <p:txBody>
-          <a:bodyPr/>
-          <a:lstStyle/>
-          <a:p>
-            <a:r>
-              <a:rPr lang="en-US" dirty="0" smtClean="0"/>
-              <a:t>Dr. </a:t>
-            </a:r>
+        <p:spPr>
+          <a:xfrm>
+            <a:off x="549275" y="1600200"/>
+            <a:ext cx="8042276" cy="4684581"/>
+          </a:xfrm>
+        </p:spPr>
+        <p:txBody>
+          <a:bodyPr anchor="ctr" anchorCtr="0">
+            <a:normAutofit fontScale="92500"/>
+          </a:bodyPr>
+          <a:lstStyle/>
+          <a:p>
+            <a:pPr marL="0" indent="0">
+              <a:lnSpc>
+                <a:spcPct val="150000"/>
+              </a:lnSpc>
+              <a:buNone/>
+            </a:pPr>
             <a:r>
               <a:rPr lang="en-US" dirty="0"/>
-              <a:t>Sameer Prabhu director of Industry Marketing, MathWorks, says, </a:t>
-            </a:r>
-            <a:endParaRPr lang="en-US" dirty="0" smtClean="0"/>
-          </a:p>
-          <a:p>
-            <a:pPr marL="352425" indent="0">
-              <a:buNone/>
-            </a:pPr>
-            <a:r>
-              <a:rPr lang="en-US" dirty="0" smtClean="0"/>
-              <a:t>“</a:t>
-            </a:r>
-            <a:r>
-              <a:rPr lang="en-US" dirty="0"/>
-              <a:t>While engineering education in India has evolved over the last few years, there is still a considerable skills gap when it comes to industry requirements. Product Engineering companies are unable to hire as it requires greater understanding of computer science and algorithms among students. Another main reasons is lack of exposure to industry-standard tools and software."</a:t>
-            </a:r>
+              <a:t>According to a survey conducted by US-based EC-Council (International Council for E-Commerce Consultants), By 2015, India needs at least 500,000 cyber professionals. Yet 99% Indian IT students incapable of secure coding. Further the report went on to say that only around 13% of IT students in India have some understanding of concepts, and that they can be trained in information security. While over 86% of them do not have requisite skills. </a:t>
+            </a:r>
+            <a:endParaRPr lang="en-US" dirty="0"/>
           </a:p>
         </p:txBody>
       </p:sp>
     </p:spTree>
     <p:extLst>
       <p:ext uri="{BB962C8B-B14F-4D97-AF65-F5344CB8AC3E}">
-        <p14:creationId xmlns:p14="http://schemas.microsoft.com/office/powerpoint/2010/main" val="567662295"/>
+        <p14:creationId xmlns:p14="http://schemas.microsoft.com/office/powerpoint/2010/main" val="641460276"/>
       </p:ext>
     </p:extLst>
   </p:cSld>
@@ -5315,35 +5509,30 @@
         </p:nvSpPr>
         <p:spPr/>
         <p:txBody>
-          <a:bodyPr>
-            <a:normAutofit lnSpcReduction="10000"/>
-          </a:bodyPr>
-          <a:lstStyle/>
-          <a:p>
+          <a:bodyPr/>
+          <a:lstStyle/>
+          <a:p>
+            <a:r>
+              <a:rPr lang="en-US" dirty="0" smtClean="0"/>
+              <a:t>Dr. </a:t>
+            </a:r>
             <a:r>
               <a:rPr lang="en-US" dirty="0"/>
-              <a:t>Raghu Panicker, country sales director, Mentor Graphics, </a:t>
-            </a:r>
+              <a:t>Sameer Prabhu director of Industry Marketing, MathWorks, says, </a:t>
+            </a:r>
+            <a:endParaRPr lang="en-US" dirty="0" smtClean="0"/>
+          </a:p>
+          <a:p>
+            <a:pPr marL="352425" indent="0">
+              <a:buNone/>
+            </a:pPr>
             <a:r>
               <a:rPr lang="en-US" dirty="0" smtClean="0"/>
-              <a:t>says, </a:t>
-            </a:r>
-          </a:p>
-          <a:p>
-            <a:pPr marL="352425" indent="0">
-              <a:buNone/>
-            </a:pPr>
+              <a:t>“</a:t>
+            </a:r>
             <a:r>
               <a:rPr lang="en-US" dirty="0"/>
-              <a:t>“Fresh engineering graduates who get hired by leading companies have to go through induction on product engineering oriented or process engineering oriented or focused in-house training programmes</a:t>
-            </a:r>
-            <a:r>
-              <a:rPr lang="en-US" dirty="0" smtClean="0"/>
-              <a:t>. </a:t>
-            </a:r>
-            <a:r>
-              <a:rPr lang="en-US" dirty="0"/>
-              <a:t>These programmes are usually driven and guided by internal engineers, managers and product/process specialists, and run for over four to six months. These programmes involve a lot of effort, time and costs for any corporate. This is where finishing schools come in.”</a:t>
+              <a:t>While engineering education in India has evolved over the last few years, there is still a considerable skills gap when it comes to industry requirements. Product Engineering companies are unable to hire as it requires greater understanding of computer science and algorithms among students. Another main reasons is lack of exposure to industry-standard tools and software."</a:t>
             </a:r>
           </a:p>
         </p:txBody>
@@ -5351,7 +5540,7 @@
     </p:spTree>
     <p:extLst>
       <p:ext uri="{BB962C8B-B14F-4D97-AF65-F5344CB8AC3E}">
-        <p14:creationId xmlns:p14="http://schemas.microsoft.com/office/powerpoint/2010/main" val="3390658830"/>
+        <p14:creationId xmlns:p14="http://schemas.microsoft.com/office/powerpoint/2010/main" val="567662295"/>
       </p:ext>
     </p:extLst>
   </p:cSld>
@@ -5442,7 +5631,7 @@
           <a:p>
             <a:r>
               <a:rPr lang="en-US" dirty="0"/>
-              <a:t>Col. N.C. Pande from EFY Tech Center, </a:t>
+              <a:t>Raghu Panicker, country sales director, Mentor Graphics, </a:t>
             </a:r>
             <a:r>
               <a:rPr lang="en-US" dirty="0" smtClean="0"/>
@@ -5455,7 +5644,15 @@
             </a:pPr>
             <a:r>
               <a:rPr lang="en-US" dirty="0"/>
-              <a:t>“While the colleges make a theoretical background for the students, finishing schools teach them the practical aspects of things. In India, a vast majority of engineering colleges and universities have not updated their curriculum to incorporate the current needs of the industry with respect to exposure to new technologies, products and processes across sectors. Hence the need for this supplementary training that can enhance ‘job readiness’ and hence cut down the time required by companies to make the fresh hires productive.”</a:t>
+              <a:t>“Fresh engineering graduates who get hired by leading companies have to go through induction on product engineering oriented or process engineering oriented or focused in-house training programmes</a:t>
+            </a:r>
+            <a:r>
+              <a:rPr lang="en-US" dirty="0" smtClean="0"/>
+              <a:t>. </a:t>
+            </a:r>
+            <a:r>
+              <a:rPr lang="en-US" dirty="0"/>
+              <a:t>These programmes are usually driven and guided by internal engineers, managers and product/process specialists, and run for over four to six months. These programmes involve a lot of effort, time and costs for any corporate. This is where finishing schools come in.”</a:t>
             </a:r>
           </a:p>
         </p:txBody>
@@ -5463,7 +5660,7 @@
     </p:spTree>
     <p:extLst>
       <p:ext uri="{BB962C8B-B14F-4D97-AF65-F5344CB8AC3E}">
-        <p14:creationId xmlns:p14="http://schemas.microsoft.com/office/powerpoint/2010/main" val="2314214305"/>
+        <p14:creationId xmlns:p14="http://schemas.microsoft.com/office/powerpoint/2010/main" val="3390658830"/>
       </p:ext>
     </p:extLst>
   </p:cSld>
@@ -5530,7 +5727,7 @@
           <a:p>
             <a:r>
               <a:rPr lang="en-US" dirty="0"/>
-              <a:t>What is Finishing School?</a:t>
+              <a:t>Experts Opinion</a:t>
             </a:r>
           </a:p>
         </p:txBody>
@@ -5545,33 +5742,29 @@
             <p:ph idx="1"/>
           </p:nvPr>
         </p:nvSpPr>
-        <p:spPr>
-          <a:xfrm>
-            <a:off x="549275" y="1600200"/>
-            <a:ext cx="8042276" cy="4684581"/>
-          </a:xfrm>
-        </p:spPr>
-        <p:txBody>
-          <a:bodyPr anchor="ctr" anchorCtr="0"/>
-          <a:lstStyle/>
-          <a:p>
-            <a:pPr marL="0" indent="0">
-              <a:lnSpc>
-                <a:spcPct val="150000"/>
-              </a:lnSpc>
+        <p:spPr/>
+        <p:txBody>
+          <a:bodyPr>
+            <a:normAutofit lnSpcReduction="10000"/>
+          </a:bodyPr>
+          <a:lstStyle/>
+          <a:p>
+            <a:r>
+              <a:rPr lang="en-US" dirty="0"/>
+              <a:t>Col. N.C. Pande from EFY Tech Center, </a:t>
+            </a:r>
+            <a:r>
+              <a:rPr lang="en-US" dirty="0" smtClean="0"/>
+              <a:t>says, </a:t>
+            </a:r>
+          </a:p>
+          <a:p>
+            <a:pPr marL="352425" indent="0">
               <a:buNone/>
             </a:pPr>
             <a:r>
               <a:rPr lang="en-US" dirty="0"/>
-              <a:t>Finishing school is a supplementary training school that attempts to compensate for the deficiencies of colleges by providing </a:t>
-            </a:r>
-            <a:r>
-              <a:rPr lang="en-US" dirty="0" smtClean="0"/>
-              <a:t>specialized </a:t>
-            </a:r>
-            <a:r>
-              <a:rPr lang="en-US" dirty="0"/>
-              <a:t>technology training (hard skills) or personality development programmes (soft skills).</a:t>
+              <a:t>“While the colleges make a theoretical background for the students, finishing schools teach them the practical aspects of things. In India, a vast majority of engineering colleges and universities have not updated their curriculum to incorporate the current needs of the industry with respect to exposure to new technologies, products and processes across sectors. Hence the need for this supplementary training that can enhance ‘job readiness’ and hence cut down the time required by companies to make the fresh hires productive.”</a:t>
             </a:r>
           </a:p>
         </p:txBody>
@@ -5579,7 +5772,7 @@
     </p:spTree>
     <p:extLst>
       <p:ext uri="{BB962C8B-B14F-4D97-AF65-F5344CB8AC3E}">
-        <p14:creationId xmlns:p14="http://schemas.microsoft.com/office/powerpoint/2010/main" val="2906170673"/>
+        <p14:creationId xmlns:p14="http://schemas.microsoft.com/office/powerpoint/2010/main" val="2314214305"/>
       </p:ext>
     </p:extLst>
   </p:cSld>
@@ -5646,7 +5839,7 @@
           <a:p>
             <a:r>
               <a:rPr lang="en-US" dirty="0"/>
-              <a:t>What role do finishing schools play?</a:t>
+              <a:t>What is Finishing School?</a:t>
             </a:r>
           </a:p>
         </p:txBody>
@@ -5663,79 +5856,39 @@
         </p:nvSpPr>
         <p:spPr>
           <a:xfrm>
-            <a:off x="549275" y="1600201"/>
-            <a:ext cx="8042276" cy="4697692"/>
+            <a:off x="549275" y="1600200"/>
+            <a:ext cx="8042276" cy="4684581"/>
           </a:xfrm>
         </p:spPr>
         <p:txBody>
-          <a:bodyPr>
-            <a:normAutofit fontScale="92500"/>
-          </a:bodyPr>
-          <a:lstStyle/>
-          <a:p>
+          <a:bodyPr anchor="ctr" anchorCtr="0"/>
+          <a:lstStyle/>
+          <a:p>
+            <a:pPr marL="0" indent="0">
+              <a:lnSpc>
+                <a:spcPct val="150000"/>
+              </a:lnSpc>
+              <a:buNone/>
+            </a:pPr>
             <a:r>
               <a:rPr lang="en-US" dirty="0"/>
-              <a:t>Increase the industry-readiness of the fresh engineering graduates so that they are productive from day </a:t>
+              <a:t>Finishing school is a supplementary training school that attempts to compensate for the deficiencies of colleges by providing </a:t>
             </a:r>
             <a:r>
               <a:rPr lang="en-US" dirty="0" smtClean="0"/>
-              <a:t>one</a:t>
-            </a:r>
-          </a:p>
-          <a:p>
+              <a:t>specialized </a:t>
+            </a:r>
             <a:r>
               <a:rPr lang="en-US" dirty="0"/>
-              <a:t>Bridge the industry and education sector gap by catering to the needs of </a:t>
-            </a:r>
-            <a:r>
-              <a:rPr lang="en-US" dirty="0" smtClean="0"/>
-              <a:t>the industry</a:t>
-            </a:r>
-          </a:p>
-          <a:p>
-            <a:r>
-              <a:rPr lang="en-US" dirty="0"/>
-              <a:t>Create a path where the industry and educational sector can </a:t>
-            </a:r>
-            <a:r>
-              <a:rPr lang="en-US" dirty="0" smtClean="0"/>
-              <a:t>synergize </a:t>
-            </a:r>
-            <a:r>
-              <a:rPr lang="en-US" dirty="0"/>
-              <a:t>efforts to train better </a:t>
-            </a:r>
-            <a:r>
-              <a:rPr lang="en-US" dirty="0" smtClean="0"/>
-              <a:t>manpower</a:t>
-            </a:r>
-          </a:p>
-          <a:p>
-            <a:r>
-              <a:rPr lang="en-US" dirty="0"/>
-              <a:t>Develop the requisite industry know-how for students to facilitate better </a:t>
-            </a:r>
-            <a:r>
-              <a:rPr lang="en-US" dirty="0" smtClean="0"/>
-              <a:t>employability</a:t>
-            </a:r>
-          </a:p>
-          <a:p>
-            <a:r>
-              <a:rPr lang="en-US" dirty="0"/>
-              <a:t>Ensure more number of industry-ready engineers are available for the industry to recruit</a:t>
-            </a:r>
-            <a:endParaRPr lang="en-US" dirty="0" smtClean="0"/>
-          </a:p>
-          <a:p>
-            <a:endParaRPr lang="en-US" dirty="0"/>
+              <a:t>technology training (hard skills) or personality development programmes (soft skills).</a:t>
+            </a:r>
           </a:p>
         </p:txBody>
       </p:sp>
     </p:spTree>
     <p:extLst>
       <p:ext uri="{BB962C8B-B14F-4D97-AF65-F5344CB8AC3E}">
-        <p14:creationId xmlns:p14="http://schemas.microsoft.com/office/powerpoint/2010/main" val="2722402689"/>
+        <p14:creationId xmlns:p14="http://schemas.microsoft.com/office/powerpoint/2010/main" val="2906170673"/>
       </p:ext>
     </p:extLst>
   </p:cSld>
@@ -5802,7 +5955,7 @@
           <a:p>
             <a:r>
               <a:rPr lang="en-US" dirty="0"/>
-              <a:t> Key Ingredients of Training Programme</a:t>
+              <a:t>What role do finishing schools play?</a:t>
             </a:r>
           </a:p>
         </p:txBody>
@@ -5817,58 +5970,81 @@
             <p:ph idx="1"/>
           </p:nvPr>
         </p:nvSpPr>
-        <p:spPr/>
-        <p:txBody>
-          <a:bodyPr anchor="ctr" anchorCtr="0">
-            <a:normAutofit/>
+        <p:spPr>
+          <a:xfrm>
+            <a:off x="549275" y="1600201"/>
+            <a:ext cx="8042276" cy="4697692"/>
+          </a:xfrm>
+        </p:spPr>
+        <p:txBody>
+          <a:bodyPr>
+            <a:normAutofit fontScale="92500"/>
           </a:bodyPr>
           <a:lstStyle/>
           <a:p>
             <a:r>
               <a:rPr lang="en-US" dirty="0"/>
-              <a:t>According to Rajeev Kabra, chief executive officer and director, Cognitel Technologies, </a:t>
+              <a:t>Increase the industry-readiness of the fresh engineering graduates so that they are productive from day </a:t>
+            </a:r>
+            <a:r>
+              <a:rPr lang="en-US" dirty="0" smtClean="0"/>
+              <a:t>one</a:t>
+            </a:r>
+          </a:p>
+          <a:p>
+            <a:r>
+              <a:rPr lang="en-US" dirty="0"/>
+              <a:t>Bridge the industry and education sector gap by catering to the needs of </a:t>
+            </a:r>
+            <a:r>
+              <a:rPr lang="en-US" dirty="0" smtClean="0"/>
+              <a:t>the industry</a:t>
+            </a:r>
+          </a:p>
+          <a:p>
+            <a:r>
+              <a:rPr lang="en-US" dirty="0"/>
+              <a:t>Create a path where the industry and educational sector can </a:t>
+            </a:r>
+            <a:r>
+              <a:rPr lang="en-US" dirty="0" smtClean="0"/>
+              <a:t>synergize </a:t>
+            </a:r>
+            <a:r>
+              <a:rPr lang="en-US" dirty="0"/>
+              <a:t>efforts to train better </a:t>
+            </a:r>
+            <a:r>
+              <a:rPr lang="en-US" dirty="0" smtClean="0"/>
+              <a:t>manpower</a:t>
+            </a:r>
+          </a:p>
+          <a:p>
+            <a:r>
+              <a:rPr lang="en-US" dirty="0"/>
+              <a:t>Develop the requisite industry know-how for students to facilitate better </a:t>
+            </a:r>
+            <a:r>
+              <a:rPr lang="en-US" dirty="0" smtClean="0"/>
+              <a:t>employability</a:t>
+            </a:r>
+          </a:p>
+          <a:p>
+            <a:r>
+              <a:rPr lang="en-US" dirty="0"/>
+              <a:t>Ensure more number of industry-ready engineers are available for the industry to recruit</a:t>
             </a:r>
             <a:endParaRPr lang="en-US" dirty="0" smtClean="0"/>
           </a:p>
           <a:p>
-            <a:pPr marL="352425" indent="0">
-              <a:buNone/>
-            </a:pPr>
-            <a:r>
-              <a:rPr lang="en-US" dirty="0"/>
-              <a:t>“There are three important ingredients for disseminating knowledge on any topic: </a:t>
-            </a:r>
-            <a:r>
-              <a:rPr lang="en-US" b="1" dirty="0"/>
-              <a:t>content design </a:t>
-            </a:r>
-            <a:r>
-              <a:rPr lang="en-US" dirty="0"/>
-              <a:t>and development that is current and relevant, content delivery through </a:t>
-            </a:r>
-            <a:r>
-              <a:rPr lang="en-US" b="1" dirty="0"/>
-              <a:t>well-qualified teachers/trainers</a:t>
-            </a:r>
-            <a:r>
-              <a:rPr lang="en-US" dirty="0"/>
-              <a:t>, and </a:t>
-            </a:r>
-            <a:r>
-              <a:rPr lang="en-US" b="1" dirty="0"/>
-              <a:t>content delivery </a:t>
-            </a:r>
-            <a:r>
-              <a:rPr lang="en-US" dirty="0"/>
-              <a:t>infrastructure through use of physical or virtual classroom, labs, etc.”</a:t>
-            </a:r>
+            <a:endParaRPr lang="en-US" dirty="0"/>
           </a:p>
         </p:txBody>
       </p:sp>
     </p:spTree>
     <p:extLst>
       <p:ext uri="{BB962C8B-B14F-4D97-AF65-F5344CB8AC3E}">
-        <p14:creationId xmlns:p14="http://schemas.microsoft.com/office/powerpoint/2010/main" val="126632208"/>
+        <p14:creationId xmlns:p14="http://schemas.microsoft.com/office/powerpoint/2010/main" val="2722402689"/>
       </p:ext>
     </p:extLst>
   </p:cSld>
@@ -5935,7 +6111,7 @@
           <a:p>
             <a:r>
               <a:rPr lang="en-US" dirty="0"/>
-              <a:t>Challenges</a:t>
+              <a:t> Key Ingredients of Training Programme</a:t>
             </a:r>
           </a:p>
         </p:txBody>
@@ -5950,122 +6126,58 @@
             <p:ph idx="1"/>
           </p:nvPr>
         </p:nvSpPr>
-        <p:spPr>
-          <a:xfrm>
-            <a:off x="549275" y="1600201"/>
-            <a:ext cx="8042276" cy="4697692"/>
-          </a:xfrm>
-        </p:spPr>
-        <p:txBody>
-          <a:bodyPr>
-            <a:normAutofit fontScale="92500" lnSpcReduction="20000"/>
+        <p:spPr/>
+        <p:txBody>
+          <a:bodyPr anchor="ctr" anchorCtr="0">
+            <a:normAutofit/>
           </a:bodyPr>
           <a:lstStyle/>
           <a:p>
             <a:r>
-              <a:rPr lang="en-US" dirty="0" smtClean="0"/>
-              <a:t>Need for </a:t>
-            </a:r>
-            <a:r>
-              <a:rPr lang="en-US" b="1" dirty="0" smtClean="0"/>
-              <a:t>Content </a:t>
+              <a:rPr lang="en-US" dirty="0"/>
+              <a:t>According to Rajeev Kabra, chief executive officer and director, Cognitel Technologies, </a:t>
+            </a:r>
+            <a:endParaRPr lang="en-US" dirty="0" smtClean="0"/>
+          </a:p>
+          <a:p>
+            <a:pPr marL="352425" indent="0">
+              <a:buNone/>
+            </a:pPr>
+            <a:r>
+              <a:rPr lang="en-US" dirty="0"/>
+              <a:t>“There are three important ingredients for disseminating knowledge on any topic: </a:t>
             </a:r>
             <a:r>
               <a:rPr lang="en-US" b="1" dirty="0"/>
-              <a:t>Design </a:t>
+              <a:t>content design </a:t>
             </a:r>
             <a:r>
               <a:rPr lang="en-US" dirty="0"/>
-              <a:t>- Should be predominantly Lab Based and </a:t>
-            </a:r>
-            <a:r>
-              <a:rPr lang="en-US" dirty="0" smtClean="0"/>
-              <a:t>Practical</a:t>
-            </a:r>
-          </a:p>
-          <a:p>
-            <a:r>
-              <a:rPr lang="en-US" dirty="0" smtClean="0"/>
-              <a:t>Need for </a:t>
-            </a:r>
-            <a:r>
-              <a:rPr lang="en-US" b="1" dirty="0" smtClean="0"/>
-              <a:t>Qualified </a:t>
+              <a:t>and development that is current and relevant, content delivery through </a:t>
             </a:r>
             <a:r>
               <a:rPr lang="en-US" b="1" dirty="0"/>
-              <a:t>Trainers </a:t>
+              <a:t>well-qualified teachers/trainers</a:t>
             </a:r>
             <a:r>
               <a:rPr lang="en-US" dirty="0"/>
-              <a:t>that can deliver this content and keep themselves updated with latest technology </a:t>
-            </a:r>
-            <a:r>
-              <a:rPr lang="en-US" dirty="0" smtClean="0"/>
-              <a:t>trends</a:t>
-            </a:r>
-          </a:p>
-          <a:p>
+              <a:t>, and </a:t>
+            </a:r>
+            <a:r>
+              <a:rPr lang="en-US" b="1" dirty="0"/>
+              <a:t>content delivery </a:t>
+            </a:r>
             <a:r>
               <a:rPr lang="en-US" dirty="0"/>
-              <a:t>Need for </a:t>
-            </a:r>
-            <a:r>
-              <a:rPr lang="en-US" b="1" dirty="0" smtClean="0"/>
-              <a:t>Infrastructure</a:t>
-            </a:r>
-            <a:r>
-              <a:rPr lang="en-US" dirty="0" smtClean="0"/>
-              <a:t> </a:t>
-            </a:r>
-            <a:r>
-              <a:rPr lang="en-US" dirty="0"/>
-              <a:t>that can be used to provide hands-on experience to students, particularly in technical </a:t>
-            </a:r>
-            <a:r>
-              <a:rPr lang="en-US" dirty="0" smtClean="0"/>
-              <a:t>education</a:t>
-            </a:r>
-          </a:p>
-          <a:p>
-            <a:r>
-              <a:rPr lang="en-US" dirty="0" smtClean="0"/>
-              <a:t>Need for </a:t>
-            </a:r>
-            <a:r>
-              <a:rPr lang="en-US" b="1" dirty="0" smtClean="0"/>
-              <a:t>One</a:t>
-            </a:r>
-            <a:r>
-              <a:rPr lang="en-US" b="1" dirty="0"/>
-              <a:t>-on-One Guide </a:t>
-            </a:r>
-            <a:r>
-              <a:rPr lang="en-US" dirty="0"/>
-              <a:t>to work with Fresh Engineers so that knowledge gap can be well understood and guided appropriately. Rather </a:t>
-            </a:r>
-            <a:r>
-              <a:rPr lang="en-US" dirty="0" smtClean="0"/>
-              <a:t>than </a:t>
-            </a:r>
-            <a:r>
-              <a:rPr lang="en-US" dirty="0"/>
-              <a:t>Classroom learning which is done in ample in Engineering </a:t>
-            </a:r>
-            <a:r>
-              <a:rPr lang="en-US" dirty="0" smtClean="0"/>
-              <a:t>Schools</a:t>
-            </a:r>
-          </a:p>
-          <a:p>
-            <a:endParaRPr lang="en-US" dirty="0"/>
+              <a:t>infrastructure through use of physical or virtual classroom, labs, etc.”</a:t>
+            </a:r>
           </a:p>
         </p:txBody>
       </p:sp>
     </p:spTree>
     <p:extLst>
       <p:ext uri="{BB962C8B-B14F-4D97-AF65-F5344CB8AC3E}">
-        <p14:creationId xmlns:p14="http://schemas.microsoft.com/office/powerpoint/2010/main" val="3787637028"/>
+        <p14:creationId xmlns:p14="http://schemas.microsoft.com/office/powerpoint/2010/main" val="126632208"/>
       </p:ext>
     </p:extLst>
   </p:cSld>

</xml_diff>